<commit_message>
Submitted metrics for iteration 12
</commit_message>
<xml_diff>
--- a/Documents/Project Management/Metrics/Bug Metrics/Bug Metrics.pptx
+++ b/Documents/Project Management/Metrics/Bug Metrics/Bug Metrics.pptx
@@ -107,6 +107,11 @@
       </a:defRPr>
     </a:lvl9pPr>
   </p:defaultTextStyle>
+  <p:extLst>
+    <p:ext uri="{EFAFB233-063F-42B5-8137-9DF3F51BA10A}">
+      <p15:sldGuideLst xmlns:p15="http://schemas.microsoft.com/office/powerpoint/2012/main"/>
+    </p:ext>
+  </p:extLst>
 </p:presentation>
 </file>
 
@@ -285,10 +290,10 @@
           </c:dLbls>
           <c:val>
             <c:numRef>
-              <c:f>Overview!$E$3:$E$12</c:f>
+              <c:f>Overview!$E$3:$E$14</c:f>
               <c:numCache>
                 <c:formatCode>General</c:formatCode>
-                <c:ptCount val="10"/>
+                <c:ptCount val="12"/>
               </c:numCache>
             </c:numRef>
           </c:val>
@@ -302,8 +307,8 @@
           <c:showBubbleSize val="0"/>
         </c:dLbls>
         <c:gapWidth val="150"/>
-        <c:axId val="452669616"/>
-        <c:axId val="452670160"/>
+        <c:axId val="-1608668896"/>
+        <c:axId val="-1608667264"/>
       </c:barChart>
       <c:lineChart>
         <c:grouping val="standard"/>
@@ -347,6 +352,27 @@
             </c:spPr>
           </c:marker>
           <c:dLbls>
+            <c:dLbl>
+              <c:idx val="3"/>
+              <c:layout>
+                <c:manualLayout>
+                  <c:x val="-7.2408104382386526E-2"/>
+                  <c:y val="-1.1255485033370989E-2"/>
+                </c:manualLayout>
+              </c:layout>
+              <c:dLblPos val="r"/>
+              <c:showLegendKey val="0"/>
+              <c:showVal val="1"/>
+              <c:showCatName val="0"/>
+              <c:showSerName val="0"/>
+              <c:showPercent val="0"/>
+              <c:showBubbleSize val="0"/>
+              <c:extLst>
+                <c:ext xmlns:c15="http://schemas.microsoft.com/office/drawing/2012/chart" uri="{CE6537A1-D6FC-4f65-9D91-7224C49458BB}">
+                  <c15:layout/>
+                </c:ext>
+              </c:extLst>
+            </c:dLbl>
             <c:spPr>
               <a:noFill/>
               <a:ln>
@@ -407,10 +433,10 @@
           </c:dLbls>
           <c:val>
             <c:numRef>
-              <c:f>Overview!$F$3:$F$12</c:f>
+              <c:f>Overview!$F$3:$F$14</c:f>
               <c:numCache>
                 <c:formatCode>General</c:formatCode>
-                <c:ptCount val="10"/>
+                <c:ptCount val="12"/>
                 <c:pt idx="0">
                   <c:v>14</c:v>
                 </c:pt>
@@ -441,6 +467,12 @@
                 <c:pt idx="9">
                   <c:v>9</c:v>
                 </c:pt>
+                <c:pt idx="10">
+                  <c:v>13</c:v>
+                </c:pt>
+                <c:pt idx="11">
+                  <c:v>4</c:v>
+                </c:pt>
               </c:numCache>
             </c:numRef>
           </c:val>
@@ -456,11 +488,11 @@
         </c:dLbls>
         <c:marker val="1"/>
         <c:smooth val="0"/>
-        <c:axId val="452669616"/>
-        <c:axId val="452670160"/>
+        <c:axId val="-1608668896"/>
+        <c:axId val="-1608667264"/>
       </c:lineChart>
       <c:catAx>
-        <c:axId val="452669616"/>
+        <c:axId val="-1608668896"/>
         <c:scaling>
           <c:orientation val="minMax"/>
         </c:scaling>
@@ -539,7 +571,7 @@
             <a:endParaRPr lang="en-US"/>
           </a:p>
         </c:txPr>
-        <c:crossAx val="452670160"/>
+        <c:crossAx val="-1608667264"/>
         <c:crosses val="autoZero"/>
         <c:auto val="1"/>
         <c:lblAlgn val="ctr"/>
@@ -547,7 +579,7 @@
         <c:noMultiLvlLbl val="0"/>
       </c:catAx>
       <c:valAx>
-        <c:axId val="452670160"/>
+        <c:axId val="-1608667264"/>
         <c:scaling>
           <c:orientation val="minMax"/>
         </c:scaling>
@@ -584,7 +616,7 @@
             <a:endParaRPr lang="en-US"/>
           </a:p>
         </c:txPr>
-        <c:crossAx val="452669616"/>
+        <c:crossAx val="-1608668896"/>
         <c:crosses val="autoZero"/>
         <c:crossBetween val="between"/>
       </c:valAx>
@@ -745,7 +777,7 @@
           <a:p>
             <a:fld id="{B5D3849F-3AA2-405C-AB9F-C878D842AC5D}" type="datetimeFigureOut">
               <a:rPr lang="en-SG" smtClean="0"/>
-              <a:t>9/3/2015</a:t>
+              <a:t>6/4/2015</a:t>
             </a:fld>
             <a:endParaRPr lang="en-SG"/>
           </a:p>
@@ -1228,7 +1260,7 @@
           <a:p>
             <a:fld id="{47634AFD-958C-473C-84F6-5DB220ACD744}" type="datetimeFigureOut">
               <a:rPr lang="en-SG" smtClean="0"/>
-              <a:t>9/3/2015</a:t>
+              <a:t>6/4/2015</a:t>
             </a:fld>
             <a:endParaRPr lang="en-SG"/>
           </a:p>
@@ -1398,7 +1430,7 @@
           <a:p>
             <a:fld id="{47634AFD-958C-473C-84F6-5DB220ACD744}" type="datetimeFigureOut">
               <a:rPr lang="en-SG" smtClean="0"/>
-              <a:t>9/3/2015</a:t>
+              <a:t>6/4/2015</a:t>
             </a:fld>
             <a:endParaRPr lang="en-SG"/>
           </a:p>
@@ -1578,7 +1610,7 @@
           <a:p>
             <a:fld id="{47634AFD-958C-473C-84F6-5DB220ACD744}" type="datetimeFigureOut">
               <a:rPr lang="en-SG" smtClean="0"/>
-              <a:t>9/3/2015</a:t>
+              <a:t>6/4/2015</a:t>
             </a:fld>
             <a:endParaRPr lang="en-SG"/>
           </a:p>
@@ -1748,7 +1780,7 @@
           <a:p>
             <a:fld id="{47634AFD-958C-473C-84F6-5DB220ACD744}" type="datetimeFigureOut">
               <a:rPr lang="en-SG" smtClean="0"/>
-              <a:t>9/3/2015</a:t>
+              <a:t>6/4/2015</a:t>
             </a:fld>
             <a:endParaRPr lang="en-SG"/>
           </a:p>
@@ -1994,7 +2026,7 @@
           <a:p>
             <a:fld id="{47634AFD-958C-473C-84F6-5DB220ACD744}" type="datetimeFigureOut">
               <a:rPr lang="en-SG" smtClean="0"/>
-              <a:t>9/3/2015</a:t>
+              <a:t>6/4/2015</a:t>
             </a:fld>
             <a:endParaRPr lang="en-SG"/>
           </a:p>
@@ -2226,7 +2258,7 @@
           <a:p>
             <a:fld id="{47634AFD-958C-473C-84F6-5DB220ACD744}" type="datetimeFigureOut">
               <a:rPr lang="en-SG" smtClean="0"/>
-              <a:t>9/3/2015</a:t>
+              <a:t>6/4/2015</a:t>
             </a:fld>
             <a:endParaRPr lang="en-SG"/>
           </a:p>
@@ -2593,7 +2625,7 @@
           <a:p>
             <a:fld id="{47634AFD-958C-473C-84F6-5DB220ACD744}" type="datetimeFigureOut">
               <a:rPr lang="en-SG" smtClean="0"/>
-              <a:t>9/3/2015</a:t>
+              <a:t>6/4/2015</a:t>
             </a:fld>
             <a:endParaRPr lang="en-SG"/>
           </a:p>
@@ -2711,7 +2743,7 @@
           <a:p>
             <a:fld id="{47634AFD-958C-473C-84F6-5DB220ACD744}" type="datetimeFigureOut">
               <a:rPr lang="en-SG" smtClean="0"/>
-              <a:t>9/3/2015</a:t>
+              <a:t>6/4/2015</a:t>
             </a:fld>
             <a:endParaRPr lang="en-SG"/>
           </a:p>
@@ -2806,7 +2838,7 @@
           <a:p>
             <a:fld id="{47634AFD-958C-473C-84F6-5DB220ACD744}" type="datetimeFigureOut">
               <a:rPr lang="en-SG" smtClean="0"/>
-              <a:t>9/3/2015</a:t>
+              <a:t>6/4/2015</a:t>
             </a:fld>
             <a:endParaRPr lang="en-SG"/>
           </a:p>
@@ -3083,7 +3115,7 @@
           <a:p>
             <a:fld id="{47634AFD-958C-473C-84F6-5DB220ACD744}" type="datetimeFigureOut">
               <a:rPr lang="en-SG" smtClean="0"/>
-              <a:t>9/3/2015</a:t>
+              <a:t>6/4/2015</a:t>
             </a:fld>
             <a:endParaRPr lang="en-SG"/>
           </a:p>
@@ -3336,7 +3368,7 @@
           <a:p>
             <a:fld id="{47634AFD-958C-473C-84F6-5DB220ACD744}" type="datetimeFigureOut">
               <a:rPr lang="en-SG" smtClean="0"/>
-              <a:t>9/3/2015</a:t>
+              <a:t>6/4/2015</a:t>
             </a:fld>
             <a:endParaRPr lang="en-SG"/>
           </a:p>
@@ -3549,7 +3581,7 @@
           <a:p>
             <a:fld id="{47634AFD-958C-473C-84F6-5DB220ACD744}" type="datetimeFigureOut">
               <a:rPr lang="en-SG" smtClean="0"/>
-              <a:t>9/3/2015</a:t>
+              <a:t>6/4/2015</a:t>
             </a:fld>
             <a:endParaRPr lang="en-SG"/>
           </a:p>
@@ -3956,21 +3988,21 @@
       </p:grpSpPr>
       <p:graphicFrame>
         <p:nvGraphicFramePr>
-          <p:cNvPr id="32" name="Chart 31"/>
+          <p:cNvPr id="10" name="Chart 9"/>
           <p:cNvGraphicFramePr>
             <a:graphicFrameLocks/>
           </p:cNvGraphicFramePr>
           <p:nvPr>
             <p:extLst>
               <p:ext uri="{D42A27DB-BD31-4B8C-83A1-F6EECF244321}">
-                <p14:modId xmlns:p14="http://schemas.microsoft.com/office/powerpoint/2010/main" val="1831799850"/>
+                <p14:modId xmlns:p14="http://schemas.microsoft.com/office/powerpoint/2010/main" val="1117983486"/>
               </p:ext>
             </p:extLst>
           </p:nvPr>
         </p:nvGraphicFramePr>
         <p:xfrm>
-          <a:off x="1533449" y="1304924"/>
-          <a:ext cx="9125101" cy="4248151"/>
+          <a:off x="1487061" y="1304924"/>
+          <a:ext cx="9217877" cy="4248151"/>
         </p:xfrm>
         <a:graphic>
           <a:graphicData uri="http://schemas.openxmlformats.org/drawingml/2006/chart">
@@ -3986,10 +4018,10 @@
         </p:nvGrpSpPr>
         <p:grpSpPr>
           <a:xfrm>
-            <a:off x="1842458" y="3762654"/>
-            <a:ext cx="7749095" cy="947369"/>
+            <a:off x="1860746" y="3770934"/>
+            <a:ext cx="7749095" cy="947370"/>
             <a:chOff x="1842448" y="4162570"/>
-            <a:chExt cx="7749095" cy="586852"/>
+            <a:chExt cx="7749095" cy="586853"/>
           </a:xfrm>
         </p:grpSpPr>
         <p:sp>
@@ -4000,7 +4032,7 @@
           </p:nvSpPr>
           <p:spPr>
             <a:xfrm>
-              <a:off x="1842448" y="4198128"/>
+              <a:off x="1842448" y="4198129"/>
               <a:ext cx="7710985" cy="551294"/>
             </a:xfrm>
             <a:prstGeom prst="rect">
@@ -4139,6 +4171,50 @@
           </p:style>
         </p:cxnSp>
       </p:grpSp>
+      <p:sp>
+        <p:nvSpPr>
+          <p:cNvPr id="3" name="Rectangle 2"/>
+          <p:cNvSpPr/>
+          <p:nvPr/>
+        </p:nvSpPr>
+        <p:spPr>
+          <a:xfrm>
+            <a:off x="9571731" y="2730500"/>
+            <a:ext cx="1045469" cy="698500"/>
+          </a:xfrm>
+          <a:prstGeom prst="rect">
+            <a:avLst/>
+          </a:prstGeom>
+          <a:solidFill>
+            <a:schemeClr val="bg1"/>
+          </a:solidFill>
+          <a:ln>
+            <a:noFill/>
+          </a:ln>
+        </p:spPr>
+        <p:style>
+          <a:lnRef idx="2">
+            <a:schemeClr val="accent6"/>
+          </a:lnRef>
+          <a:fillRef idx="1">
+            <a:schemeClr val="lt1"/>
+          </a:fillRef>
+          <a:effectRef idx="0">
+            <a:schemeClr val="accent6"/>
+          </a:effectRef>
+          <a:fontRef idx="minor">
+            <a:schemeClr val="dk1"/>
+          </a:fontRef>
+        </p:style>
+        <p:txBody>
+          <a:bodyPr rtlCol="0" anchor="ctr"/>
+          <a:lstStyle/>
+          <a:p>
+            <a:pPr algn="ctr"/>
+            <a:endParaRPr lang="en-SG"/>
+          </a:p>
+        </p:txBody>
+      </p:sp>
     </p:spTree>
     <p:extLst>
       <p:ext uri="{BB962C8B-B14F-4D97-AF65-F5344CB8AC3E}">
@@ -4149,11 +4225,11 @@
   <p:clrMapOvr>
     <a:masterClrMapping/>
   </p:clrMapOvr>
-  <mc:AlternateContent xmlns:mc="http://schemas.openxmlformats.org/markup-compatibility/2006">
-    <mc:Choice xmlns:p14="http://schemas.microsoft.com/office/powerpoint/2010/main" Requires="p14">
+  <mc:AlternateContent xmlns:mc="http://schemas.openxmlformats.org/markup-compatibility/2006" xmlns:p14="http://schemas.microsoft.com/office/powerpoint/2010/main">
+    <mc:Choice Requires="p14">
       <p:transition spd="slow" p14:dur="2000"/>
     </mc:Choice>
-    <mc:Fallback>
+    <mc:Fallback xmlns="">
       <p:transition spd="slow"/>
     </mc:Fallback>
   </mc:AlternateContent>

</xml_diff>